<commit_message>
web 9 and 10 edited
</commit_message>
<xml_diff>
--- a/вебы/презентация/Веб-сервис для коллективных переводов.pptx
+++ b/вебы/презентация/Веб-сервис для коллективных переводов.pptx
@@ -27,8 +27,9 @@
     <p:sldId id="278" r:id="rId21"/>
     <p:sldId id="280" r:id="rId22"/>
     <p:sldId id="281" r:id="rId23"/>
-    <p:sldId id="266" r:id="rId24"/>
-    <p:sldId id="282" r:id="rId25"/>
+    <p:sldId id="283" r:id="rId24"/>
+    <p:sldId id="266" r:id="rId25"/>
+    <p:sldId id="282" r:id="rId26"/>
   </p:sldIdLst>
   <p:sldSz cx="12192000" cy="6858000"/>
   <p:notesSz cx="6858000" cy="9144000"/>
@@ -5687,6 +5688,389 @@
       </p:grpSpPr>
       <p:sp>
         <p:nvSpPr>
+          <p:cNvPr id="5" name="Заголовок 4">
+            <a:extLst>
+              <a:ext uri="{FF2B5EF4-FFF2-40B4-BE49-F238E27FC236}">
+                <a16:creationId xmlns:a16="http://schemas.microsoft.com/office/drawing/2014/main" id="{7560A900-6727-4F94-9BA2-F7D93E8DB1E1}"/>
+              </a:ext>
+            </a:extLst>
+          </p:cNvPr>
+          <p:cNvSpPr>
+            <a:spLocks noGrp="1"/>
+          </p:cNvSpPr>
+          <p:nvPr>
+            <p:ph type="title"/>
+          </p:nvPr>
+        </p:nvSpPr>
+        <p:spPr/>
+        <p:txBody>
+          <a:bodyPr/>
+          <a:lstStyle/>
+          <a:p>
+            <a:r>
+              <a:rPr lang="ru-RU" dirty="0"/>
+              <a:t>Установка</a:t>
+            </a:r>
+            <a:endParaRPr lang="en-GB" dirty="0"/>
+          </a:p>
+        </p:txBody>
+      </p:sp>
+      <p:sp>
+        <p:nvSpPr>
+          <p:cNvPr id="6" name="Объект 5">
+            <a:extLst>
+              <a:ext uri="{FF2B5EF4-FFF2-40B4-BE49-F238E27FC236}">
+                <a16:creationId xmlns:a16="http://schemas.microsoft.com/office/drawing/2014/main" id="{8EB2A506-FA4D-4115-AB98-C771566F260D}"/>
+              </a:ext>
+            </a:extLst>
+          </p:cNvPr>
+          <p:cNvSpPr>
+            <a:spLocks noGrp="1"/>
+          </p:cNvSpPr>
+          <p:nvPr>
+            <p:ph idx="1"/>
+          </p:nvPr>
+        </p:nvSpPr>
+        <p:spPr/>
+        <p:txBody>
+          <a:bodyPr>
+            <a:noAutofit/>
+          </a:bodyPr>
+          <a:lstStyle/>
+          <a:p>
+            <a:r>
+              <a:rPr lang="ru-RU" sz="1300" dirty="0"/>
+              <a:t>Поскольку проект требует размещения на собственном сервере, что делает затруднительным его запуска для доступном для студентов сервере </a:t>
+            </a:r>
+            <a:r>
+              <a:rPr lang="en-US" sz="1300" dirty="0"/>
+              <a:t>kappa, </a:t>
+            </a:r>
+            <a:r>
+              <a:rPr lang="ru-RU" sz="1300" dirty="0"/>
+              <a:t>проект получит собственный домен в будущем. В настоящий момент код проекта находится в открытом доступе, и его можно установить локально на своем персональном компьютере. Для этого нужно:</a:t>
+            </a:r>
+          </a:p>
+          <a:p>
+            <a:pPr marL="342900" indent="-342900">
+              <a:lnSpc>
+                <a:spcPct val="100000"/>
+              </a:lnSpc>
+              <a:spcBef>
+                <a:spcPts val="200"/>
+              </a:spcBef>
+              <a:buFont typeface="+mj-lt"/>
+              <a:buAutoNum type="arabicPeriod"/>
+            </a:pPr>
+            <a:r>
+              <a:rPr lang="ru-RU" sz="1300" dirty="0"/>
+              <a:t>Перейти по ссылке на страницу репозитория на сайте </a:t>
+            </a:r>
+            <a:r>
+              <a:rPr lang="ru-RU" sz="1300" dirty="0" err="1"/>
+              <a:t>Github</a:t>
+            </a:r>
+            <a:r>
+              <a:rPr lang="ru-RU" sz="1300" dirty="0"/>
+              <a:t>: </a:t>
+            </a:r>
+            <a:r>
+              <a:rPr lang="en-US" sz="1300" dirty="0">
+                <a:hlinkClick r:id="rId2"/>
+              </a:rPr>
+              <a:t>https://github.com/ipaingo/Desman-Translate</a:t>
+            </a:r>
+            <a:endParaRPr lang="ru-RU" sz="1300" dirty="0"/>
+          </a:p>
+          <a:p>
+            <a:pPr marL="342900" indent="-342900">
+              <a:lnSpc>
+                <a:spcPct val="100000"/>
+              </a:lnSpc>
+              <a:spcBef>
+                <a:spcPts val="200"/>
+              </a:spcBef>
+              <a:buFont typeface="+mj-lt"/>
+              <a:buAutoNum type="arabicPeriod"/>
+            </a:pPr>
+            <a:r>
+              <a:rPr lang="ru-RU" sz="1300" dirty="0"/>
+              <a:t>Скачать и разархивировать проект или клонировать </a:t>
+            </a:r>
+            <a:r>
+              <a:rPr lang="ru-RU" sz="1300" dirty="0" err="1"/>
+              <a:t>git</a:t>
+            </a:r>
+            <a:r>
+              <a:rPr lang="ru-RU" sz="1300" dirty="0"/>
+              <a:t>-репозиторий на сервере или в локальном хранилище.</a:t>
+            </a:r>
+          </a:p>
+          <a:p>
+            <a:pPr marL="342900" indent="-342900">
+              <a:lnSpc>
+                <a:spcPct val="100000"/>
+              </a:lnSpc>
+              <a:spcBef>
+                <a:spcPts val="200"/>
+              </a:spcBef>
+              <a:buFont typeface="+mj-lt"/>
+              <a:buAutoNum type="arabicPeriod"/>
+            </a:pPr>
+            <a:r>
+              <a:rPr lang="ru-RU" sz="1300" dirty="0" err="1"/>
+              <a:t>Окрыть</a:t>
+            </a:r>
+            <a:r>
+              <a:rPr lang="ru-RU" sz="1300" dirty="0"/>
+              <a:t> терминал, перейти в папку скачанного проекта, убедиться, что пользователь имеет установщик пакетов </a:t>
+            </a:r>
+            <a:r>
+              <a:rPr lang="ru-RU" sz="1300" dirty="0" err="1"/>
+              <a:t>npm</a:t>
+            </a:r>
+            <a:r>
+              <a:rPr lang="ru-RU" sz="1300" dirty="0"/>
+              <a:t>. Выполнить команду "</a:t>
+            </a:r>
+            <a:r>
+              <a:rPr lang="ru-RU" sz="1300" dirty="0" err="1"/>
+              <a:t>npm</a:t>
+            </a:r>
+            <a:r>
+              <a:rPr lang="ru-RU" sz="1300" dirty="0"/>
+              <a:t> </a:t>
+            </a:r>
+            <a:r>
+              <a:rPr lang="ru-RU" sz="1300" dirty="0" err="1"/>
+              <a:t>install</a:t>
+            </a:r>
+            <a:r>
+              <a:rPr lang="ru-RU" sz="1300" dirty="0"/>
+              <a:t>".</a:t>
+            </a:r>
+          </a:p>
+          <a:p>
+            <a:pPr marL="342900" indent="-342900">
+              <a:lnSpc>
+                <a:spcPct val="100000"/>
+              </a:lnSpc>
+              <a:spcBef>
+                <a:spcPts val="200"/>
+              </a:spcBef>
+              <a:buFont typeface="+mj-lt"/>
+              <a:buAutoNum type="arabicPeriod"/>
+            </a:pPr>
+            <a:r>
+              <a:rPr lang="ru-RU" sz="1300" dirty="0"/>
+              <a:t>Если необходимо запустить сайт на локальном сервере – написать команду в терминале "</a:t>
+            </a:r>
+            <a:r>
+              <a:rPr lang="ru-RU" sz="1300" dirty="0" err="1"/>
+              <a:t>npm</a:t>
+            </a:r>
+            <a:r>
+              <a:rPr lang="ru-RU" sz="1300" dirty="0"/>
+              <a:t> </a:t>
+            </a:r>
+            <a:r>
+              <a:rPr lang="ru-RU" sz="1300" dirty="0" err="1"/>
+              <a:t>start</a:t>
+            </a:r>
+            <a:r>
+              <a:rPr lang="ru-RU" sz="1300" dirty="0"/>
+              <a:t>". Сайт будет доступен по адресу http://localhost:3000/</a:t>
+            </a:r>
+          </a:p>
+          <a:p>
+            <a:pPr marL="342900" indent="-342900">
+              <a:lnSpc>
+                <a:spcPct val="100000"/>
+              </a:lnSpc>
+              <a:spcBef>
+                <a:spcPts val="200"/>
+              </a:spcBef>
+              <a:buFont typeface="+mj-lt"/>
+              <a:buAutoNum type="arabicPeriod"/>
+            </a:pPr>
+            <a:r>
+              <a:rPr lang="ru-RU" sz="1300" dirty="0"/>
+              <a:t>Если необходимо развернуть сайт на сервере – написать команду "</a:t>
+            </a:r>
+            <a:r>
+              <a:rPr lang="ru-RU" sz="1300" dirty="0" err="1"/>
+              <a:t>npm</a:t>
+            </a:r>
+            <a:r>
+              <a:rPr lang="ru-RU" sz="1300" dirty="0"/>
+              <a:t> </a:t>
+            </a:r>
+            <a:r>
+              <a:rPr lang="ru-RU" sz="1300" dirty="0" err="1"/>
+              <a:t>run</a:t>
+            </a:r>
+            <a:r>
+              <a:rPr lang="ru-RU" sz="1300" dirty="0"/>
+              <a:t> </a:t>
+            </a:r>
+            <a:r>
+              <a:rPr lang="ru-RU" sz="1300" dirty="0" err="1"/>
+              <a:t>build</a:t>
+            </a:r>
+            <a:r>
+              <a:rPr lang="ru-RU" sz="1300" dirty="0"/>
+              <a:t>". Создастся директория </a:t>
+            </a:r>
+            <a:r>
+              <a:rPr lang="ru-RU" sz="1300" dirty="0" err="1"/>
+              <a:t>build</a:t>
+            </a:r>
+            <a:r>
+              <a:rPr lang="ru-RU" sz="1300" dirty="0"/>
+              <a:t> – это готовое приложение, которое можно разместить на сервере.</a:t>
+            </a:r>
+          </a:p>
+          <a:p>
+            <a:pPr marL="342900" indent="-342900">
+              <a:lnSpc>
+                <a:spcPct val="100000"/>
+              </a:lnSpc>
+              <a:spcBef>
+                <a:spcPts val="200"/>
+              </a:spcBef>
+              <a:buFont typeface="+mj-lt"/>
+              <a:buAutoNum type="arabicPeriod"/>
+            </a:pPr>
+            <a:r>
+              <a:rPr lang="ru-RU" sz="1300" dirty="0"/>
+              <a:t>Для запуска проекта на локальной машине:</a:t>
+            </a:r>
+          </a:p>
+          <a:p>
+            <a:pPr marL="342900" indent="-342900">
+              <a:lnSpc>
+                <a:spcPct val="100000"/>
+              </a:lnSpc>
+              <a:spcBef>
+                <a:spcPts val="200"/>
+              </a:spcBef>
+              <a:buFont typeface="+mj-lt"/>
+              <a:buAutoNum type="arabicPeriod"/>
+            </a:pPr>
+            <a:r>
+              <a:rPr lang="ru-RU" sz="1300" dirty="0"/>
+              <a:t>В терминале, находясь в директории проекта, написать команду </a:t>
+            </a:r>
+            <a:r>
+              <a:rPr lang="ru-RU" sz="1300" dirty="0" err="1"/>
+              <a:t>npm</a:t>
+            </a:r>
+            <a:r>
+              <a:rPr lang="ru-RU" sz="1300" dirty="0"/>
+              <a:t> </a:t>
+            </a:r>
+            <a:r>
+              <a:rPr lang="ru-RU" sz="1300" dirty="0" err="1"/>
+              <a:t>run</a:t>
+            </a:r>
+            <a:r>
+              <a:rPr lang="ru-RU" sz="1300" dirty="0"/>
+              <a:t> </a:t>
+            </a:r>
+            <a:r>
+              <a:rPr lang="ru-RU" sz="1300" dirty="0" err="1"/>
+              <a:t>build</a:t>
+            </a:r>
+            <a:r>
+              <a:rPr lang="ru-RU" sz="1300" dirty="0"/>
+              <a:t>.</a:t>
+            </a:r>
+          </a:p>
+          <a:p>
+            <a:pPr marL="342900" indent="-342900">
+              <a:lnSpc>
+                <a:spcPct val="100000"/>
+              </a:lnSpc>
+              <a:spcBef>
+                <a:spcPts val="200"/>
+              </a:spcBef>
+              <a:buFont typeface="+mj-lt"/>
+              <a:buAutoNum type="arabicPeriod"/>
+            </a:pPr>
+            <a:r>
+              <a:rPr lang="ru-RU" sz="1300" dirty="0"/>
+              <a:t>В директории создастся папка </a:t>
+            </a:r>
+            <a:r>
+              <a:rPr lang="ru-RU" sz="1300" dirty="0" err="1"/>
+              <a:t>build</a:t>
+            </a:r>
+            <a:r>
+              <a:rPr lang="ru-RU" sz="1300" dirty="0"/>
+              <a:t>, в которой находится файл index.html, который и является исполняемым файлом.</a:t>
+            </a:r>
+          </a:p>
+          <a:p>
+            <a:pPr marL="342900" indent="-342900">
+              <a:lnSpc>
+                <a:spcPct val="100000"/>
+              </a:lnSpc>
+              <a:spcBef>
+                <a:spcPts val="200"/>
+              </a:spcBef>
+              <a:buFont typeface="+mj-lt"/>
+              <a:buAutoNum type="arabicPeriod"/>
+            </a:pPr>
+            <a:r>
+              <a:rPr lang="ru-RU" sz="1300" dirty="0"/>
+              <a:t>Папку </a:t>
+            </a:r>
+            <a:r>
+              <a:rPr lang="ru-RU" sz="1300" dirty="0" err="1"/>
+              <a:t>build</a:t>
+            </a:r>
+            <a:r>
+              <a:rPr lang="ru-RU" sz="1300" dirty="0"/>
+              <a:t> можно разместить на сервере.</a:t>
+            </a:r>
+          </a:p>
+          <a:p>
+            <a:endParaRPr lang="en-GB" sz="1200" dirty="0"/>
+          </a:p>
+        </p:txBody>
+      </p:sp>
+    </p:spTree>
+    <p:extLst>
+      <p:ext uri="{BB962C8B-B14F-4D97-AF65-F5344CB8AC3E}">
+        <p14:creationId xmlns:p14="http://schemas.microsoft.com/office/powerpoint/2010/main" val="1203184751"/>
+      </p:ext>
+    </p:extLst>
+  </p:cSld>
+  <p:clrMapOvr>
+    <a:masterClrMapping/>
+  </p:clrMapOvr>
+</p:sld>
+</file>
+
+<file path=ppt/slides/slide24.xml><?xml version="1.0" encoding="utf-8"?>
+<p:sld xmlns:a="http://schemas.openxmlformats.org/drawingml/2006/main" xmlns:r="http://schemas.openxmlformats.org/officeDocument/2006/relationships" xmlns:p="http://schemas.openxmlformats.org/presentationml/2006/main">
+  <p:cSld>
+    <p:spTree>
+      <p:nvGrpSpPr>
+        <p:cNvPr id="1" name=""/>
+        <p:cNvGrpSpPr/>
+        <p:nvPr/>
+      </p:nvGrpSpPr>
+      <p:grpSpPr>
+        <a:xfrm>
+          <a:off x="0" y="0"/>
+          <a:ext cx="0" cy="0"/>
+          <a:chOff x="0" y="0"/>
+          <a:chExt cx="0" cy="0"/>
+        </a:xfrm>
+      </p:grpSpPr>
+      <p:sp>
+        <p:nvSpPr>
           <p:cNvPr id="2" name="Заголовок 1"/>
           <p:cNvSpPr>
             <a:spLocks noGrp="1"/>
@@ -5834,7 +6218,7 @@
 </p:sld>
 </file>
 
-<file path=ppt/slides/slide24.xml><?xml version="1.0" encoding="utf-8"?>
+<file path=ppt/slides/slide25.xml><?xml version="1.0" encoding="utf-8"?>
 <p:sld xmlns:a="http://schemas.openxmlformats.org/drawingml/2006/main" xmlns:r="http://schemas.openxmlformats.org/officeDocument/2006/relationships" xmlns:p="http://schemas.openxmlformats.org/presentationml/2006/main">
   <p:cSld>
     <p:spTree>

</xml_diff>